<commit_message>
Added a green bar
</commit_message>
<xml_diff>
--- a/assets/images.pptx
+++ b/assets/images.pptx
@@ -6,6 +6,7 @@
   </p:sldMasterIdLst>
   <p:sldIdLst>
     <p:sldId id="256" r:id="rId2"/>
+    <p:sldId id="257" r:id="rId3"/>
   </p:sldIdLst>
   <p:sldSz cx="6480175" cy="11520488"/>
   <p:notesSz cx="6858000" cy="9144000"/>
@@ -104,6 +105,11 @@
       </a:defRPr>
     </a:lvl9pPr>
   </p:defaultTextStyle>
+  <p:extLst>
+    <p:ext uri="{EFAFB233-063F-42B5-8137-9DF3F51BA10A}">
+      <p15:sldGuideLst xmlns:p15="http://schemas.microsoft.com/office/powerpoint/2012/main"/>
+    </p:ext>
+  </p:extLst>
 </p:presentation>
 </file>
 
@@ -111,6 +117,7 @@
 <p1510:revInfo xmlns:a="http://schemas.openxmlformats.org/drawingml/2006/main" xmlns:r="http://schemas.openxmlformats.org/officeDocument/2006/relationships" xmlns:p1510="http://schemas.microsoft.com/office/powerpoint/2015/10/main">
   <p1510:revLst>
     <p1510:client id="{B7B1665D-D88B-4612-B162-FE0F6D97825A}" v="5" dt="2024-03-21T14:21:15.257"/>
+    <p1510:client id="{E06D0A26-AC22-4BF5-A863-C0599575D8F1}" v="2" dt="2024-03-21T17:36:57.418"/>
   </p1510:revLst>
 </p1510:revInfo>
 </file>
@@ -340,6 +347,182 @@
           </pc:spChg>
         </pc:sldLayoutChg>
       </pc:sldMasterChg>
+    </pc:docChg>
+  </pc:docChgLst>
+  <pc:docChgLst>
+    <pc:chgData name="Jan K" userId="d066db4a5de46abf" providerId="LiveId" clId="{E06D0A26-AC22-4BF5-A863-C0599575D8F1}"/>
+    <pc:docChg chg="addSld modSld">
+      <pc:chgData name="Jan K" userId="d066db4a5de46abf" providerId="LiveId" clId="{E06D0A26-AC22-4BF5-A863-C0599575D8F1}" dt="2024-03-21T17:37:22.900" v="6" actId="207"/>
+      <pc:docMkLst>
+        <pc:docMk/>
+      </pc:docMkLst>
+      <pc:sldChg chg="delSp modSp add mod">
+        <pc:chgData name="Jan K" userId="d066db4a5de46abf" providerId="LiveId" clId="{E06D0A26-AC22-4BF5-A863-C0599575D8F1}" dt="2024-03-21T17:37:22.900" v="6" actId="207"/>
+        <pc:sldMkLst>
+          <pc:docMk/>
+          <pc:sldMk cId="1260927255" sldId="257"/>
+        </pc:sldMkLst>
+        <pc:spChg chg="mod topLvl">
+          <ac:chgData name="Jan K" userId="d066db4a5de46abf" providerId="LiveId" clId="{E06D0A26-AC22-4BF5-A863-C0599575D8F1}" dt="2024-03-21T17:36:57.418" v="3" actId="165"/>
+          <ac:spMkLst>
+            <pc:docMk/>
+            <pc:sldMk cId="1260927255" sldId="257"/>
+            <ac:spMk id="4" creationId="{CC17740F-0A09-0FB7-5D2D-DE7361ECC7DA}"/>
+          </ac:spMkLst>
+        </pc:spChg>
+        <pc:spChg chg="mod topLvl">
+          <ac:chgData name="Jan K" userId="d066db4a5de46abf" providerId="LiveId" clId="{E06D0A26-AC22-4BF5-A863-C0599575D8F1}" dt="2024-03-21T17:37:22.900" v="6" actId="207"/>
+          <ac:spMkLst>
+            <pc:docMk/>
+            <pc:sldMk cId="1260927255" sldId="257"/>
+            <ac:spMk id="7" creationId="{EDEF23CD-83BF-61E7-517C-A15D8CA3C8BC}"/>
+          </ac:spMkLst>
+        </pc:spChg>
+        <pc:spChg chg="mod topLvl">
+          <ac:chgData name="Jan K" userId="d066db4a5de46abf" providerId="LiveId" clId="{E06D0A26-AC22-4BF5-A863-C0599575D8F1}" dt="2024-03-21T17:37:22.900" v="6" actId="207"/>
+          <ac:spMkLst>
+            <pc:docMk/>
+            <pc:sldMk cId="1260927255" sldId="257"/>
+            <ac:spMk id="8" creationId="{DCFDBFD9-D15B-A97D-C622-D902D2A88CB8}"/>
+          </ac:spMkLst>
+        </pc:spChg>
+        <pc:spChg chg="mod topLvl">
+          <ac:chgData name="Jan K" userId="d066db4a5de46abf" providerId="LiveId" clId="{E06D0A26-AC22-4BF5-A863-C0599575D8F1}" dt="2024-03-21T17:37:22.900" v="6" actId="207"/>
+          <ac:spMkLst>
+            <pc:docMk/>
+            <pc:sldMk cId="1260927255" sldId="257"/>
+            <ac:spMk id="9" creationId="{94E6BB4A-4A23-3065-FFC0-2872D62BDCDF}"/>
+          </ac:spMkLst>
+        </pc:spChg>
+        <pc:spChg chg="mod topLvl">
+          <ac:chgData name="Jan K" userId="d066db4a5de46abf" providerId="LiveId" clId="{E06D0A26-AC22-4BF5-A863-C0599575D8F1}" dt="2024-03-21T17:37:22.900" v="6" actId="207"/>
+          <ac:spMkLst>
+            <pc:docMk/>
+            <pc:sldMk cId="1260927255" sldId="257"/>
+            <ac:spMk id="12" creationId="{58297A60-7730-F05E-ECC6-EC066F60C1CE}"/>
+          </ac:spMkLst>
+        </pc:spChg>
+        <pc:spChg chg="mod topLvl">
+          <ac:chgData name="Jan K" userId="d066db4a5de46abf" providerId="LiveId" clId="{E06D0A26-AC22-4BF5-A863-C0599575D8F1}" dt="2024-03-21T17:37:22.900" v="6" actId="207"/>
+          <ac:spMkLst>
+            <pc:docMk/>
+            <pc:sldMk cId="1260927255" sldId="257"/>
+            <ac:spMk id="13" creationId="{DA89D580-7B72-1A68-36EB-355B5F9AB40C}"/>
+          </ac:spMkLst>
+        </pc:spChg>
+        <pc:spChg chg="mod topLvl">
+          <ac:chgData name="Jan K" userId="d066db4a5de46abf" providerId="LiveId" clId="{E06D0A26-AC22-4BF5-A863-C0599575D8F1}" dt="2024-03-21T17:37:22.900" v="6" actId="207"/>
+          <ac:spMkLst>
+            <pc:docMk/>
+            <pc:sldMk cId="1260927255" sldId="257"/>
+            <ac:spMk id="16" creationId="{7254182C-6530-5D71-8157-5C993BAD4982}"/>
+          </ac:spMkLst>
+        </pc:spChg>
+        <pc:spChg chg="mod topLvl">
+          <ac:chgData name="Jan K" userId="d066db4a5de46abf" providerId="LiveId" clId="{E06D0A26-AC22-4BF5-A863-C0599575D8F1}" dt="2024-03-21T17:37:22.900" v="6" actId="207"/>
+          <ac:spMkLst>
+            <pc:docMk/>
+            <pc:sldMk cId="1260927255" sldId="257"/>
+            <ac:spMk id="17" creationId="{CAB65173-B45B-5113-E308-EB8453B8C17F}"/>
+          </ac:spMkLst>
+        </pc:spChg>
+        <pc:spChg chg="mod topLvl">
+          <ac:chgData name="Jan K" userId="d066db4a5de46abf" providerId="LiveId" clId="{E06D0A26-AC22-4BF5-A863-C0599575D8F1}" dt="2024-03-21T17:37:22.900" v="6" actId="207"/>
+          <ac:spMkLst>
+            <pc:docMk/>
+            <pc:sldMk cId="1260927255" sldId="257"/>
+            <ac:spMk id="20" creationId="{8B253A26-4A9B-0ADA-4DA3-382A2B82EECC}"/>
+          </ac:spMkLst>
+        </pc:spChg>
+        <pc:spChg chg="mod topLvl">
+          <ac:chgData name="Jan K" userId="d066db4a5de46abf" providerId="LiveId" clId="{E06D0A26-AC22-4BF5-A863-C0599575D8F1}" dt="2024-03-21T17:37:07.341" v="5" actId="692"/>
+          <ac:spMkLst>
+            <pc:docMk/>
+            <pc:sldMk cId="1260927255" sldId="257"/>
+            <ac:spMk id="22" creationId="{AA9023E6-96F3-DFF9-404F-BD245E5A73DA}"/>
+          </ac:spMkLst>
+        </pc:spChg>
+        <pc:grpChg chg="del">
+          <ac:chgData name="Jan K" userId="d066db4a5de46abf" providerId="LiveId" clId="{E06D0A26-AC22-4BF5-A863-C0599575D8F1}" dt="2024-03-21T17:36:57.418" v="3" actId="165"/>
+          <ac:grpSpMkLst>
+            <pc:docMk/>
+            <pc:sldMk cId="1260927255" sldId="257"/>
+            <ac:grpSpMk id="23" creationId="{33833DB2-CE08-FDC6-05E9-9C350F32949A}"/>
+          </ac:grpSpMkLst>
+        </pc:grpChg>
+        <pc:cxnChg chg="mod topLvl">
+          <ac:chgData name="Jan K" userId="d066db4a5de46abf" providerId="LiveId" clId="{E06D0A26-AC22-4BF5-A863-C0599575D8F1}" dt="2024-03-21T17:37:02.539" v="4" actId="692"/>
+          <ac:cxnSpMkLst>
+            <pc:docMk/>
+            <pc:sldMk cId="1260927255" sldId="257"/>
+            <ac:cxnSpMk id="5" creationId="{F383E214-BB8E-CFF6-8668-33A915C049DE}"/>
+          </ac:cxnSpMkLst>
+        </pc:cxnChg>
+        <pc:cxnChg chg="mod topLvl">
+          <ac:chgData name="Jan K" userId="d066db4a5de46abf" providerId="LiveId" clId="{E06D0A26-AC22-4BF5-A863-C0599575D8F1}" dt="2024-03-21T17:37:02.539" v="4" actId="692"/>
+          <ac:cxnSpMkLst>
+            <pc:docMk/>
+            <pc:sldMk cId="1260927255" sldId="257"/>
+            <ac:cxnSpMk id="6" creationId="{A23FCB41-7B68-DA94-4F06-7714B1A5BDAA}"/>
+          </ac:cxnSpMkLst>
+        </pc:cxnChg>
+        <pc:cxnChg chg="mod topLvl">
+          <ac:chgData name="Jan K" userId="d066db4a5de46abf" providerId="LiveId" clId="{E06D0A26-AC22-4BF5-A863-C0599575D8F1}" dt="2024-03-21T17:37:02.539" v="4" actId="692"/>
+          <ac:cxnSpMkLst>
+            <pc:docMk/>
+            <pc:sldMk cId="1260927255" sldId="257"/>
+            <ac:cxnSpMk id="10" creationId="{E525E8A3-090F-0398-ECC2-D06914210877}"/>
+          </ac:cxnSpMkLst>
+        </pc:cxnChg>
+        <pc:cxnChg chg="mod topLvl">
+          <ac:chgData name="Jan K" userId="d066db4a5de46abf" providerId="LiveId" clId="{E06D0A26-AC22-4BF5-A863-C0599575D8F1}" dt="2024-03-21T17:37:02.539" v="4" actId="692"/>
+          <ac:cxnSpMkLst>
+            <pc:docMk/>
+            <pc:sldMk cId="1260927255" sldId="257"/>
+            <ac:cxnSpMk id="11" creationId="{37122FB4-11C5-62D0-2175-4FD9EF8B75B5}"/>
+          </ac:cxnSpMkLst>
+        </pc:cxnChg>
+        <pc:cxnChg chg="mod topLvl">
+          <ac:chgData name="Jan K" userId="d066db4a5de46abf" providerId="LiveId" clId="{E06D0A26-AC22-4BF5-A863-C0599575D8F1}" dt="2024-03-21T17:37:02.539" v="4" actId="692"/>
+          <ac:cxnSpMkLst>
+            <pc:docMk/>
+            <pc:sldMk cId="1260927255" sldId="257"/>
+            <ac:cxnSpMk id="14" creationId="{9CF75F65-F7DB-AF2B-3FB0-8545B090594D}"/>
+          </ac:cxnSpMkLst>
+        </pc:cxnChg>
+        <pc:cxnChg chg="mod topLvl">
+          <ac:chgData name="Jan K" userId="d066db4a5de46abf" providerId="LiveId" clId="{E06D0A26-AC22-4BF5-A863-C0599575D8F1}" dt="2024-03-21T17:37:02.539" v="4" actId="692"/>
+          <ac:cxnSpMkLst>
+            <pc:docMk/>
+            <pc:sldMk cId="1260927255" sldId="257"/>
+            <ac:cxnSpMk id="15" creationId="{A84E6C84-0AE5-6457-FFCB-E75318797E09}"/>
+          </ac:cxnSpMkLst>
+        </pc:cxnChg>
+        <pc:cxnChg chg="mod topLvl">
+          <ac:chgData name="Jan K" userId="d066db4a5de46abf" providerId="LiveId" clId="{E06D0A26-AC22-4BF5-A863-C0599575D8F1}" dt="2024-03-21T17:37:02.539" v="4" actId="692"/>
+          <ac:cxnSpMkLst>
+            <pc:docMk/>
+            <pc:sldMk cId="1260927255" sldId="257"/>
+            <ac:cxnSpMk id="18" creationId="{E9F7C776-F1E5-10AF-B2DD-F233B6929FBC}"/>
+          </ac:cxnSpMkLst>
+        </pc:cxnChg>
+        <pc:cxnChg chg="mod topLvl">
+          <ac:chgData name="Jan K" userId="d066db4a5de46abf" providerId="LiveId" clId="{E06D0A26-AC22-4BF5-A863-C0599575D8F1}" dt="2024-03-21T17:37:02.539" v="4" actId="692"/>
+          <ac:cxnSpMkLst>
+            <pc:docMk/>
+            <pc:sldMk cId="1260927255" sldId="257"/>
+            <ac:cxnSpMk id="19" creationId="{49AAA70E-F545-0D80-56C8-68417312DBD7}"/>
+          </ac:cxnSpMkLst>
+        </pc:cxnChg>
+        <pc:cxnChg chg="mod topLvl">
+          <ac:chgData name="Jan K" userId="d066db4a5de46abf" providerId="LiveId" clId="{E06D0A26-AC22-4BF5-A863-C0599575D8F1}" dt="2024-03-21T17:36:57.418" v="3" actId="165"/>
+          <ac:cxnSpMkLst>
+            <pc:docMk/>
+            <pc:sldMk cId="1260927255" sldId="257"/>
+            <ac:cxnSpMk id="21" creationId="{F94390CD-3919-C79D-10EF-F714AF704BE9}"/>
+          </ac:cxnSpMkLst>
+        </pc:cxnChg>
+      </pc:sldChg>
     </pc:docChg>
   </pc:docChgLst>
 </pc:chgInfo>
@@ -4111,6 +4294,863 @@
 </p:sld>
 </file>
 
+<file path=ppt/slides/slide2.xml><?xml version="1.0" encoding="utf-8"?>
+<p:sld xmlns:a="http://schemas.openxmlformats.org/drawingml/2006/main" xmlns:r="http://schemas.openxmlformats.org/officeDocument/2006/relationships" xmlns:p="http://schemas.openxmlformats.org/presentationml/2006/main">
+  <p:cSld>
+    <p:spTree>
+      <p:nvGrpSpPr>
+        <p:cNvPr id="1" name=""/>
+        <p:cNvGrpSpPr/>
+        <p:nvPr/>
+      </p:nvGrpSpPr>
+      <p:grpSpPr>
+        <a:xfrm>
+          <a:off x="0" y="0"/>
+          <a:ext cx="0" cy="0"/>
+          <a:chOff x="0" y="0"/>
+          <a:chExt cx="0" cy="0"/>
+        </a:xfrm>
+      </p:grpSpPr>
+      <p:sp>
+        <p:nvSpPr>
+          <p:cNvPr id="4" name="Rechteck 3">
+            <a:extLst>
+              <a:ext uri="{FF2B5EF4-FFF2-40B4-BE49-F238E27FC236}">
+                <a16:creationId xmlns:a16="http://schemas.microsoft.com/office/drawing/2014/main" id="{CC17740F-0A09-0FB7-5D2D-DE7361ECC7DA}"/>
+              </a:ext>
+            </a:extLst>
+          </p:cNvPr>
+          <p:cNvSpPr/>
+          <p:nvPr/>
+        </p:nvSpPr>
+        <p:spPr>
+          <a:xfrm>
+            <a:off x="462944" y="6751452"/>
+            <a:ext cx="5657143" cy="51429"/>
+          </a:xfrm>
+          <a:prstGeom prst="rect">
+            <a:avLst/>
+          </a:prstGeom>
+          <a:gradFill>
+            <a:gsLst>
+              <a:gs pos="87000">
+                <a:schemeClr val="accent6">
+                  <a:lumMod val="60000"/>
+                  <a:lumOff val="40000"/>
+                </a:schemeClr>
+              </a:gs>
+              <a:gs pos="100000">
+                <a:schemeClr val="bg1"/>
+              </a:gs>
+            </a:gsLst>
+            <a:lin ang="0" scaled="0"/>
+          </a:gradFill>
+          <a:ln>
+            <a:noFill/>
+          </a:ln>
+        </p:spPr>
+        <p:style>
+          <a:lnRef idx="2">
+            <a:schemeClr val="accent1">
+              <a:shade val="15000"/>
+            </a:schemeClr>
+          </a:lnRef>
+          <a:fillRef idx="1">
+            <a:schemeClr val="accent1"/>
+          </a:fillRef>
+          <a:effectRef idx="0">
+            <a:schemeClr val="accent1"/>
+          </a:effectRef>
+          <a:fontRef idx="minor">
+            <a:schemeClr val="lt1"/>
+          </a:fontRef>
+        </p:style>
+        <p:txBody>
+          <a:bodyPr rtlCol="0" anchor="ctr"/>
+          <a:lstStyle/>
+          <a:p>
+            <a:pPr algn="ctr"/>
+            <a:endParaRPr lang="de-DE" sz="1600"/>
+          </a:p>
+        </p:txBody>
+      </p:sp>
+      <p:cxnSp>
+        <p:nvCxnSpPr>
+          <p:cNvPr id="5" name="Gerader Verbinder 4">
+            <a:extLst>
+              <a:ext uri="{FF2B5EF4-FFF2-40B4-BE49-F238E27FC236}">
+                <a16:creationId xmlns:a16="http://schemas.microsoft.com/office/drawing/2014/main" id="{F383E214-BB8E-CFF6-8668-33A915C049DE}"/>
+              </a:ext>
+            </a:extLst>
+          </p:cNvPr>
+          <p:cNvCxnSpPr>
+            <a:cxnSpLocks/>
+          </p:cNvCxnSpPr>
+          <p:nvPr/>
+        </p:nvCxnSpPr>
+        <p:spPr>
+          <a:xfrm>
+            <a:off x="1105063" y="6685134"/>
+            <a:ext cx="0" cy="205715"/>
+          </a:xfrm>
+          <a:prstGeom prst="line">
+            <a:avLst/>
+          </a:prstGeom>
+          <a:ln w="19050">
+            <a:solidFill>
+              <a:srgbClr val="92D050"/>
+            </a:solidFill>
+          </a:ln>
+        </p:spPr>
+        <p:style>
+          <a:lnRef idx="1">
+            <a:schemeClr val="accent1"/>
+          </a:lnRef>
+          <a:fillRef idx="0">
+            <a:schemeClr val="accent1"/>
+          </a:fillRef>
+          <a:effectRef idx="0">
+            <a:schemeClr val="accent1"/>
+          </a:effectRef>
+          <a:fontRef idx="minor">
+            <a:schemeClr val="tx1"/>
+          </a:fontRef>
+        </p:style>
+      </p:cxnSp>
+      <p:cxnSp>
+        <p:nvCxnSpPr>
+          <p:cNvPr id="6" name="Gerader Verbinder 5">
+            <a:extLst>
+              <a:ext uri="{FF2B5EF4-FFF2-40B4-BE49-F238E27FC236}">
+                <a16:creationId xmlns:a16="http://schemas.microsoft.com/office/drawing/2014/main" id="{A23FCB41-7B68-DA94-4F06-7714B1A5BDAA}"/>
+              </a:ext>
+            </a:extLst>
+          </p:cNvPr>
+          <p:cNvCxnSpPr>
+            <a:cxnSpLocks/>
+          </p:cNvCxnSpPr>
+          <p:nvPr/>
+        </p:nvCxnSpPr>
+        <p:spPr>
+          <a:xfrm>
+            <a:off x="1747183" y="6685134"/>
+            <a:ext cx="0" cy="205715"/>
+          </a:xfrm>
+          <a:prstGeom prst="line">
+            <a:avLst/>
+          </a:prstGeom>
+          <a:ln w="19050">
+            <a:solidFill>
+              <a:srgbClr val="92D050"/>
+            </a:solidFill>
+          </a:ln>
+        </p:spPr>
+        <p:style>
+          <a:lnRef idx="1">
+            <a:schemeClr val="accent1"/>
+          </a:lnRef>
+          <a:fillRef idx="0">
+            <a:schemeClr val="accent1"/>
+          </a:fillRef>
+          <a:effectRef idx="0">
+            <a:schemeClr val="accent1"/>
+          </a:effectRef>
+          <a:fontRef idx="minor">
+            <a:schemeClr val="tx1"/>
+          </a:fontRef>
+        </p:style>
+      </p:cxnSp>
+      <p:sp>
+        <p:nvSpPr>
+          <p:cNvPr id="7" name="Textfeld 6">
+            <a:extLst>
+              <a:ext uri="{FF2B5EF4-FFF2-40B4-BE49-F238E27FC236}">
+                <a16:creationId xmlns:a16="http://schemas.microsoft.com/office/drawing/2014/main" id="{EDEF23CD-83BF-61E7-517C-A15D8CA3C8BC}"/>
+              </a:ext>
+            </a:extLst>
+          </p:cNvPr>
+          <p:cNvSpPr txBox="1"/>
+          <p:nvPr/>
+        </p:nvSpPr>
+        <p:spPr>
+          <a:xfrm>
+            <a:off x="853061" y="6385411"/>
+            <a:ext cx="514286" cy="338553"/>
+          </a:xfrm>
+          <a:prstGeom prst="rect">
+            <a:avLst/>
+          </a:prstGeom>
+          <a:noFill/>
+        </p:spPr>
+        <p:txBody>
+          <a:bodyPr wrap="square" rtlCol="0">
+            <a:spAutoFit/>
+          </a:bodyPr>
+          <a:lstStyle/>
+          <a:p>
+            <a:pPr algn="ctr"/>
+            <a:r>
+              <a:rPr lang="de-DE" sz="1600" dirty="0">
+                <a:solidFill>
+                  <a:srgbClr val="92D050"/>
+                </a:solidFill>
+              </a:rPr>
+              <a:t>10</a:t>
+            </a:r>
+          </a:p>
+        </p:txBody>
+      </p:sp>
+      <p:sp>
+        <p:nvSpPr>
+          <p:cNvPr id="8" name="Textfeld 7">
+            <a:extLst>
+              <a:ext uri="{FF2B5EF4-FFF2-40B4-BE49-F238E27FC236}">
+                <a16:creationId xmlns:a16="http://schemas.microsoft.com/office/drawing/2014/main" id="{DCFDBFD9-D15B-A97D-C622-D902D2A88CB8}"/>
+              </a:ext>
+            </a:extLst>
+          </p:cNvPr>
+          <p:cNvSpPr txBox="1"/>
+          <p:nvPr/>
+        </p:nvSpPr>
+        <p:spPr>
+          <a:xfrm>
+            <a:off x="1480111" y="6874288"/>
+            <a:ext cx="514286" cy="338553"/>
+          </a:xfrm>
+          <a:prstGeom prst="rect">
+            <a:avLst/>
+          </a:prstGeom>
+          <a:noFill/>
+        </p:spPr>
+        <p:txBody>
+          <a:bodyPr wrap="square" rtlCol="0">
+            <a:spAutoFit/>
+          </a:bodyPr>
+          <a:lstStyle/>
+          <a:p>
+            <a:pPr algn="ctr"/>
+            <a:r>
+              <a:rPr lang="de-DE" sz="1600" dirty="0">
+                <a:solidFill>
+                  <a:srgbClr val="92D050"/>
+                </a:solidFill>
+              </a:rPr>
+              <a:t>20</a:t>
+            </a:r>
+          </a:p>
+        </p:txBody>
+      </p:sp>
+      <p:sp>
+        <p:nvSpPr>
+          <p:cNvPr id="9" name="Textfeld 8">
+            <a:extLst>
+              <a:ext uri="{FF2B5EF4-FFF2-40B4-BE49-F238E27FC236}">
+                <a16:creationId xmlns:a16="http://schemas.microsoft.com/office/drawing/2014/main" id="{94E6BB4A-4A23-3065-FFC0-2872D62BDCDF}"/>
+              </a:ext>
+            </a:extLst>
+          </p:cNvPr>
+          <p:cNvSpPr txBox="1"/>
+          <p:nvPr/>
+        </p:nvSpPr>
+        <p:spPr>
+          <a:xfrm>
+            <a:off x="2134328" y="6385411"/>
+            <a:ext cx="514286" cy="338553"/>
+          </a:xfrm>
+          <a:prstGeom prst="rect">
+            <a:avLst/>
+          </a:prstGeom>
+          <a:noFill/>
+        </p:spPr>
+        <p:txBody>
+          <a:bodyPr wrap="square" rtlCol="0">
+            <a:spAutoFit/>
+          </a:bodyPr>
+          <a:lstStyle/>
+          <a:p>
+            <a:pPr algn="ctr"/>
+            <a:r>
+              <a:rPr lang="de-DE" sz="1600" dirty="0">
+                <a:solidFill>
+                  <a:srgbClr val="92D050"/>
+                </a:solidFill>
+              </a:rPr>
+              <a:t>30</a:t>
+            </a:r>
+          </a:p>
+        </p:txBody>
+      </p:sp>
+      <p:cxnSp>
+        <p:nvCxnSpPr>
+          <p:cNvPr id="10" name="Gerader Verbinder 9">
+            <a:extLst>
+              <a:ext uri="{FF2B5EF4-FFF2-40B4-BE49-F238E27FC236}">
+                <a16:creationId xmlns:a16="http://schemas.microsoft.com/office/drawing/2014/main" id="{E525E8A3-090F-0398-ECC2-D06914210877}"/>
+              </a:ext>
+            </a:extLst>
+          </p:cNvPr>
+          <p:cNvCxnSpPr>
+            <a:cxnSpLocks/>
+          </p:cNvCxnSpPr>
+          <p:nvPr/>
+        </p:nvCxnSpPr>
+        <p:spPr>
+          <a:xfrm>
+            <a:off x="2389304" y="6685134"/>
+            <a:ext cx="0" cy="205715"/>
+          </a:xfrm>
+          <a:prstGeom prst="line">
+            <a:avLst/>
+          </a:prstGeom>
+          <a:ln w="19050">
+            <a:solidFill>
+              <a:srgbClr val="92D050"/>
+            </a:solidFill>
+          </a:ln>
+        </p:spPr>
+        <p:style>
+          <a:lnRef idx="1">
+            <a:schemeClr val="accent1"/>
+          </a:lnRef>
+          <a:fillRef idx="0">
+            <a:schemeClr val="accent1"/>
+          </a:fillRef>
+          <a:effectRef idx="0">
+            <a:schemeClr val="accent1"/>
+          </a:effectRef>
+          <a:fontRef idx="minor">
+            <a:schemeClr val="tx1"/>
+          </a:fontRef>
+        </p:style>
+      </p:cxnSp>
+      <p:cxnSp>
+        <p:nvCxnSpPr>
+          <p:cNvPr id="11" name="Gerader Verbinder 10">
+            <a:extLst>
+              <a:ext uri="{FF2B5EF4-FFF2-40B4-BE49-F238E27FC236}">
+                <a16:creationId xmlns:a16="http://schemas.microsoft.com/office/drawing/2014/main" id="{37122FB4-11C5-62D0-2175-4FD9EF8B75B5}"/>
+              </a:ext>
+            </a:extLst>
+          </p:cNvPr>
+          <p:cNvCxnSpPr>
+            <a:cxnSpLocks/>
+          </p:cNvCxnSpPr>
+          <p:nvPr/>
+        </p:nvCxnSpPr>
+        <p:spPr>
+          <a:xfrm>
+            <a:off x="3031424" y="6685134"/>
+            <a:ext cx="0" cy="205715"/>
+          </a:xfrm>
+          <a:prstGeom prst="line">
+            <a:avLst/>
+          </a:prstGeom>
+          <a:ln w="19050">
+            <a:solidFill>
+              <a:srgbClr val="92D050"/>
+            </a:solidFill>
+          </a:ln>
+        </p:spPr>
+        <p:style>
+          <a:lnRef idx="1">
+            <a:schemeClr val="accent1"/>
+          </a:lnRef>
+          <a:fillRef idx="0">
+            <a:schemeClr val="accent1"/>
+          </a:fillRef>
+          <a:effectRef idx="0">
+            <a:schemeClr val="accent1"/>
+          </a:effectRef>
+          <a:fontRef idx="minor">
+            <a:schemeClr val="tx1"/>
+          </a:fontRef>
+        </p:style>
+      </p:cxnSp>
+      <p:sp>
+        <p:nvSpPr>
+          <p:cNvPr id="12" name="Textfeld 11">
+            <a:extLst>
+              <a:ext uri="{FF2B5EF4-FFF2-40B4-BE49-F238E27FC236}">
+                <a16:creationId xmlns:a16="http://schemas.microsoft.com/office/drawing/2014/main" id="{58297A60-7730-F05E-ECC6-EC066F60C1CE}"/>
+              </a:ext>
+            </a:extLst>
+          </p:cNvPr>
+          <p:cNvSpPr txBox="1"/>
+          <p:nvPr/>
+        </p:nvSpPr>
+        <p:spPr>
+          <a:xfrm>
+            <a:off x="2771076" y="6874288"/>
+            <a:ext cx="514286" cy="338553"/>
+          </a:xfrm>
+          <a:prstGeom prst="rect">
+            <a:avLst/>
+          </a:prstGeom>
+          <a:noFill/>
+        </p:spPr>
+        <p:txBody>
+          <a:bodyPr wrap="square" rtlCol="0">
+            <a:spAutoFit/>
+          </a:bodyPr>
+          <a:lstStyle/>
+          <a:p>
+            <a:pPr algn="ctr"/>
+            <a:r>
+              <a:rPr lang="de-DE" sz="1600" dirty="0">
+                <a:solidFill>
+                  <a:srgbClr val="92D050"/>
+                </a:solidFill>
+              </a:rPr>
+              <a:t>40</a:t>
+            </a:r>
+          </a:p>
+        </p:txBody>
+      </p:sp>
+      <p:sp>
+        <p:nvSpPr>
+          <p:cNvPr id="13" name="Textfeld 12">
+            <a:extLst>
+              <a:ext uri="{FF2B5EF4-FFF2-40B4-BE49-F238E27FC236}">
+                <a16:creationId xmlns:a16="http://schemas.microsoft.com/office/drawing/2014/main" id="{DA89D580-7B72-1A68-36EB-355B5F9AB40C}"/>
+              </a:ext>
+            </a:extLst>
+          </p:cNvPr>
+          <p:cNvSpPr txBox="1"/>
+          <p:nvPr/>
+        </p:nvSpPr>
+        <p:spPr>
+          <a:xfrm>
+            <a:off x="3421045" y="6385411"/>
+            <a:ext cx="514286" cy="338553"/>
+          </a:xfrm>
+          <a:prstGeom prst="rect">
+            <a:avLst/>
+          </a:prstGeom>
+          <a:noFill/>
+        </p:spPr>
+        <p:txBody>
+          <a:bodyPr wrap="square" rtlCol="0">
+            <a:spAutoFit/>
+          </a:bodyPr>
+          <a:lstStyle/>
+          <a:p>
+            <a:pPr algn="ctr"/>
+            <a:r>
+              <a:rPr lang="de-DE" sz="1600" dirty="0">
+                <a:solidFill>
+                  <a:srgbClr val="92D050"/>
+                </a:solidFill>
+              </a:rPr>
+              <a:t>50</a:t>
+            </a:r>
+          </a:p>
+        </p:txBody>
+      </p:sp>
+      <p:cxnSp>
+        <p:nvCxnSpPr>
+          <p:cNvPr id="14" name="Gerader Verbinder 13">
+            <a:extLst>
+              <a:ext uri="{FF2B5EF4-FFF2-40B4-BE49-F238E27FC236}">
+                <a16:creationId xmlns:a16="http://schemas.microsoft.com/office/drawing/2014/main" id="{9CF75F65-F7DB-AF2B-3FB0-8545B090594D}"/>
+              </a:ext>
+            </a:extLst>
+          </p:cNvPr>
+          <p:cNvCxnSpPr>
+            <a:cxnSpLocks/>
+          </p:cNvCxnSpPr>
+          <p:nvPr/>
+        </p:nvCxnSpPr>
+        <p:spPr>
+          <a:xfrm>
+            <a:off x="3673543" y="6685134"/>
+            <a:ext cx="0" cy="205715"/>
+          </a:xfrm>
+          <a:prstGeom prst="line">
+            <a:avLst/>
+          </a:prstGeom>
+          <a:ln w="19050">
+            <a:solidFill>
+              <a:srgbClr val="92D050"/>
+            </a:solidFill>
+          </a:ln>
+        </p:spPr>
+        <p:style>
+          <a:lnRef idx="1">
+            <a:schemeClr val="accent1"/>
+          </a:lnRef>
+          <a:fillRef idx="0">
+            <a:schemeClr val="accent1"/>
+          </a:fillRef>
+          <a:effectRef idx="0">
+            <a:schemeClr val="accent1"/>
+          </a:effectRef>
+          <a:fontRef idx="minor">
+            <a:schemeClr val="tx1"/>
+          </a:fontRef>
+        </p:style>
+      </p:cxnSp>
+      <p:cxnSp>
+        <p:nvCxnSpPr>
+          <p:cNvPr id="15" name="Gerader Verbinder 14">
+            <a:extLst>
+              <a:ext uri="{FF2B5EF4-FFF2-40B4-BE49-F238E27FC236}">
+                <a16:creationId xmlns:a16="http://schemas.microsoft.com/office/drawing/2014/main" id="{A84E6C84-0AE5-6457-FFCB-E75318797E09}"/>
+              </a:ext>
+            </a:extLst>
+          </p:cNvPr>
+          <p:cNvCxnSpPr>
+            <a:cxnSpLocks/>
+          </p:cNvCxnSpPr>
+          <p:nvPr/>
+        </p:nvCxnSpPr>
+        <p:spPr>
+          <a:xfrm>
+            <a:off x="4315663" y="6685134"/>
+            <a:ext cx="0" cy="205715"/>
+          </a:xfrm>
+          <a:prstGeom prst="line">
+            <a:avLst/>
+          </a:prstGeom>
+          <a:ln w="19050">
+            <a:solidFill>
+              <a:srgbClr val="92D050"/>
+            </a:solidFill>
+          </a:ln>
+        </p:spPr>
+        <p:style>
+          <a:lnRef idx="1">
+            <a:schemeClr val="accent1"/>
+          </a:lnRef>
+          <a:fillRef idx="0">
+            <a:schemeClr val="accent1"/>
+          </a:fillRef>
+          <a:effectRef idx="0">
+            <a:schemeClr val="accent1"/>
+          </a:effectRef>
+          <a:fontRef idx="minor">
+            <a:schemeClr val="tx1"/>
+          </a:fontRef>
+        </p:style>
+      </p:cxnSp>
+      <p:sp>
+        <p:nvSpPr>
+          <p:cNvPr id="16" name="Textfeld 15">
+            <a:extLst>
+              <a:ext uri="{FF2B5EF4-FFF2-40B4-BE49-F238E27FC236}">
+                <a16:creationId xmlns:a16="http://schemas.microsoft.com/office/drawing/2014/main" id="{7254182C-6530-5D71-8157-5C993BAD4982}"/>
+              </a:ext>
+            </a:extLst>
+          </p:cNvPr>
+          <p:cNvSpPr txBox="1"/>
+          <p:nvPr/>
+        </p:nvSpPr>
+        <p:spPr>
+          <a:xfrm>
+            <a:off x="4061132" y="6874288"/>
+            <a:ext cx="514286" cy="338553"/>
+          </a:xfrm>
+          <a:prstGeom prst="rect">
+            <a:avLst/>
+          </a:prstGeom>
+          <a:noFill/>
+        </p:spPr>
+        <p:txBody>
+          <a:bodyPr wrap="square" rtlCol="0">
+            <a:spAutoFit/>
+          </a:bodyPr>
+          <a:lstStyle/>
+          <a:p>
+            <a:pPr algn="ctr"/>
+            <a:r>
+              <a:rPr lang="de-DE" sz="1600" dirty="0">
+                <a:solidFill>
+                  <a:srgbClr val="92D050"/>
+                </a:solidFill>
+              </a:rPr>
+              <a:t>60</a:t>
+            </a:r>
+          </a:p>
+        </p:txBody>
+      </p:sp>
+      <p:sp>
+        <p:nvSpPr>
+          <p:cNvPr id="17" name="Textfeld 16">
+            <a:extLst>
+              <a:ext uri="{FF2B5EF4-FFF2-40B4-BE49-F238E27FC236}">
+                <a16:creationId xmlns:a16="http://schemas.microsoft.com/office/drawing/2014/main" id="{CAB65173-B45B-5113-E308-EB8453B8C17F}"/>
+              </a:ext>
+            </a:extLst>
+          </p:cNvPr>
+          <p:cNvSpPr txBox="1"/>
+          <p:nvPr/>
+        </p:nvSpPr>
+        <p:spPr>
+          <a:xfrm>
+            <a:off x="4707762" y="6385411"/>
+            <a:ext cx="514286" cy="338553"/>
+          </a:xfrm>
+          <a:prstGeom prst="rect">
+            <a:avLst/>
+          </a:prstGeom>
+          <a:noFill/>
+        </p:spPr>
+        <p:txBody>
+          <a:bodyPr wrap="square" rtlCol="0">
+            <a:spAutoFit/>
+          </a:bodyPr>
+          <a:lstStyle/>
+          <a:p>
+            <a:pPr algn="ctr"/>
+            <a:r>
+              <a:rPr lang="de-DE" sz="1600" dirty="0">
+                <a:solidFill>
+                  <a:srgbClr val="92D050"/>
+                </a:solidFill>
+              </a:rPr>
+              <a:t>70</a:t>
+            </a:r>
+          </a:p>
+        </p:txBody>
+      </p:sp>
+      <p:cxnSp>
+        <p:nvCxnSpPr>
+          <p:cNvPr id="18" name="Gerader Verbinder 17">
+            <a:extLst>
+              <a:ext uri="{FF2B5EF4-FFF2-40B4-BE49-F238E27FC236}">
+                <a16:creationId xmlns:a16="http://schemas.microsoft.com/office/drawing/2014/main" id="{E9F7C776-F1E5-10AF-B2DD-F233B6929FBC}"/>
+              </a:ext>
+            </a:extLst>
+          </p:cNvPr>
+          <p:cNvCxnSpPr>
+            <a:cxnSpLocks/>
+          </p:cNvCxnSpPr>
+          <p:nvPr/>
+        </p:nvCxnSpPr>
+        <p:spPr>
+          <a:xfrm>
+            <a:off x="4957784" y="6685134"/>
+            <a:ext cx="0" cy="205715"/>
+          </a:xfrm>
+          <a:prstGeom prst="line">
+            <a:avLst/>
+          </a:prstGeom>
+          <a:ln w="19050">
+            <a:solidFill>
+              <a:srgbClr val="92D050"/>
+            </a:solidFill>
+          </a:ln>
+        </p:spPr>
+        <p:style>
+          <a:lnRef idx="1">
+            <a:schemeClr val="accent1"/>
+          </a:lnRef>
+          <a:fillRef idx="0">
+            <a:schemeClr val="accent1"/>
+          </a:fillRef>
+          <a:effectRef idx="0">
+            <a:schemeClr val="accent1"/>
+          </a:effectRef>
+          <a:fontRef idx="minor">
+            <a:schemeClr val="tx1"/>
+          </a:fontRef>
+        </p:style>
+      </p:cxnSp>
+      <p:cxnSp>
+        <p:nvCxnSpPr>
+          <p:cNvPr id="19" name="Gerader Verbinder 18">
+            <a:extLst>
+              <a:ext uri="{FF2B5EF4-FFF2-40B4-BE49-F238E27FC236}">
+                <a16:creationId xmlns:a16="http://schemas.microsoft.com/office/drawing/2014/main" id="{49AAA70E-F545-0D80-56C8-68417312DBD7}"/>
+              </a:ext>
+            </a:extLst>
+          </p:cNvPr>
+          <p:cNvCxnSpPr>
+            <a:cxnSpLocks/>
+          </p:cNvCxnSpPr>
+          <p:nvPr/>
+        </p:nvCxnSpPr>
+        <p:spPr>
+          <a:xfrm>
+            <a:off x="5599900" y="6685134"/>
+            <a:ext cx="0" cy="205715"/>
+          </a:xfrm>
+          <a:prstGeom prst="line">
+            <a:avLst/>
+          </a:prstGeom>
+          <a:ln w="19050">
+            <a:solidFill>
+              <a:srgbClr val="92D050"/>
+            </a:solidFill>
+          </a:ln>
+        </p:spPr>
+        <p:style>
+          <a:lnRef idx="1">
+            <a:schemeClr val="accent1"/>
+          </a:lnRef>
+          <a:fillRef idx="0">
+            <a:schemeClr val="accent1"/>
+          </a:fillRef>
+          <a:effectRef idx="0">
+            <a:schemeClr val="accent1"/>
+          </a:effectRef>
+          <a:fontRef idx="minor">
+            <a:schemeClr val="tx1"/>
+          </a:fontRef>
+        </p:style>
+      </p:cxnSp>
+      <p:sp>
+        <p:nvSpPr>
+          <p:cNvPr id="20" name="Textfeld 19">
+            <a:extLst>
+              <a:ext uri="{FF2B5EF4-FFF2-40B4-BE49-F238E27FC236}">
+                <a16:creationId xmlns:a16="http://schemas.microsoft.com/office/drawing/2014/main" id="{8B253A26-4A9B-0ADA-4DA3-382A2B82EECC}"/>
+              </a:ext>
+            </a:extLst>
+          </p:cNvPr>
+          <p:cNvSpPr txBox="1"/>
+          <p:nvPr/>
+        </p:nvSpPr>
+        <p:spPr>
+          <a:xfrm>
+            <a:off x="5340151" y="6874288"/>
+            <a:ext cx="514286" cy="338553"/>
+          </a:xfrm>
+          <a:prstGeom prst="rect">
+            <a:avLst/>
+          </a:prstGeom>
+          <a:noFill/>
+        </p:spPr>
+        <p:txBody>
+          <a:bodyPr wrap="square" rtlCol="0">
+            <a:spAutoFit/>
+          </a:bodyPr>
+          <a:lstStyle/>
+          <a:p>
+            <a:pPr algn="ctr"/>
+            <a:r>
+              <a:rPr lang="de-DE" sz="1600" dirty="0">
+                <a:solidFill>
+                  <a:srgbClr val="92D050"/>
+                </a:solidFill>
+              </a:rPr>
+              <a:t>80</a:t>
+            </a:r>
+          </a:p>
+        </p:txBody>
+      </p:sp>
+      <p:cxnSp>
+        <p:nvCxnSpPr>
+          <p:cNvPr id="21" name="Gerader Verbinder 20">
+            <a:extLst>
+              <a:ext uri="{FF2B5EF4-FFF2-40B4-BE49-F238E27FC236}">
+                <a16:creationId xmlns:a16="http://schemas.microsoft.com/office/drawing/2014/main" id="{F94390CD-3919-C79D-10EF-F714AF704BE9}"/>
+              </a:ext>
+            </a:extLst>
+          </p:cNvPr>
+          <p:cNvCxnSpPr>
+            <a:cxnSpLocks/>
+          </p:cNvCxnSpPr>
+          <p:nvPr/>
+        </p:nvCxnSpPr>
+        <p:spPr>
+          <a:xfrm>
+            <a:off x="462944" y="6685134"/>
+            <a:ext cx="0" cy="205715"/>
+          </a:xfrm>
+          <a:prstGeom prst="line">
+            <a:avLst/>
+          </a:prstGeom>
+          <a:ln w="19050">
+            <a:solidFill>
+              <a:schemeClr val="tx1">
+                <a:lumMod val="50000"/>
+                <a:lumOff val="50000"/>
+              </a:schemeClr>
+            </a:solidFill>
+          </a:ln>
+        </p:spPr>
+        <p:style>
+          <a:lnRef idx="1">
+            <a:schemeClr val="accent1"/>
+          </a:lnRef>
+          <a:fillRef idx="0">
+            <a:schemeClr val="accent1"/>
+          </a:fillRef>
+          <a:effectRef idx="0">
+            <a:schemeClr val="accent1"/>
+          </a:effectRef>
+          <a:fontRef idx="minor">
+            <a:schemeClr val="tx1"/>
+          </a:fontRef>
+        </p:style>
+      </p:cxnSp>
+      <p:sp>
+        <p:nvSpPr>
+          <p:cNvPr id="22" name="Ellipse 21">
+            <a:extLst>
+              <a:ext uri="{FF2B5EF4-FFF2-40B4-BE49-F238E27FC236}">
+                <a16:creationId xmlns:a16="http://schemas.microsoft.com/office/drawing/2014/main" id="{AA9023E6-96F3-DFF9-404F-BD245E5A73DA}"/>
+              </a:ext>
+            </a:extLst>
+          </p:cNvPr>
+          <p:cNvSpPr/>
+          <p:nvPr/>
+        </p:nvSpPr>
+        <p:spPr>
+          <a:xfrm>
+            <a:off x="360087" y="6674309"/>
+            <a:ext cx="205715" cy="205715"/>
+          </a:xfrm>
+          <a:prstGeom prst="ellipse">
+            <a:avLst/>
+          </a:prstGeom>
+          <a:solidFill>
+            <a:schemeClr val="bg1"/>
+          </a:solidFill>
+          <a:ln>
+            <a:solidFill>
+              <a:srgbClr val="92D050"/>
+            </a:solidFill>
+          </a:ln>
+        </p:spPr>
+        <p:style>
+          <a:lnRef idx="2">
+            <a:schemeClr val="accent1">
+              <a:shade val="15000"/>
+            </a:schemeClr>
+          </a:lnRef>
+          <a:fillRef idx="1">
+            <a:schemeClr val="accent1"/>
+          </a:fillRef>
+          <a:effectRef idx="0">
+            <a:schemeClr val="accent1"/>
+          </a:effectRef>
+          <a:fontRef idx="minor">
+            <a:schemeClr val="lt1"/>
+          </a:fontRef>
+        </p:style>
+        <p:txBody>
+          <a:bodyPr rtlCol="0" anchor="ctr"/>
+          <a:lstStyle/>
+          <a:p>
+            <a:pPr algn="ctr"/>
+            <a:endParaRPr lang="de-DE" sz="1600"/>
+          </a:p>
+        </p:txBody>
+      </p:sp>
+    </p:spTree>
+    <p:extLst>
+      <p:ext uri="{BB962C8B-B14F-4D97-AF65-F5344CB8AC3E}">
+        <p14:creationId xmlns:p14="http://schemas.microsoft.com/office/powerpoint/2010/main" val="1260927255"/>
+      </p:ext>
+    </p:extLst>
+  </p:cSld>
+  <p:clrMapOvr>
+    <a:masterClrMapping/>
+  </p:clrMapOvr>
+</p:sld>
+</file>
+
 <file path=ppt/theme/theme1.xml><?xml version="1.0" encoding="utf-8"?>
 <a:theme xmlns:a="http://schemas.openxmlformats.org/drawingml/2006/main" name="Office">
   <a:themeElements>

</xml_diff>

<commit_message>
Made the app widescreen and added a marker
</commit_message>
<xml_diff>
--- a/assets/images.pptx
+++ b/assets/images.pptx
@@ -7,6 +7,7 @@
   <p:sldIdLst>
     <p:sldId id="256" r:id="rId2"/>
     <p:sldId id="257" r:id="rId3"/>
+    <p:sldId id="258" r:id="rId4"/>
   </p:sldIdLst>
   <p:sldSz cx="6480175" cy="11520488"/>
   <p:notesSz cx="6858000" cy="9144000"/>
@@ -117,7 +118,7 @@
 <p1510:revInfo xmlns:a="http://schemas.openxmlformats.org/drawingml/2006/main" xmlns:r="http://schemas.openxmlformats.org/officeDocument/2006/relationships" xmlns:p1510="http://schemas.microsoft.com/office/powerpoint/2015/10/main">
   <p1510:revLst>
     <p1510:client id="{B7B1665D-D88B-4612-B162-FE0F6D97825A}" v="5" dt="2024-03-21T14:21:15.257"/>
-    <p1510:client id="{E06D0A26-AC22-4BF5-A863-C0599575D8F1}" v="2" dt="2024-03-21T17:36:57.418"/>
+    <p1510:client id="{E06D0A26-AC22-4BF5-A863-C0599575D8F1}" v="3" dt="2024-03-21T17:53:44.840"/>
   </p1510:revLst>
 </p1510:revInfo>
 </file>
@@ -351,8 +352,8 @@
   </pc:docChgLst>
   <pc:docChgLst>
     <pc:chgData name="Jan K" userId="d066db4a5de46abf" providerId="LiveId" clId="{E06D0A26-AC22-4BF5-A863-C0599575D8F1}"/>
-    <pc:docChg chg="addSld modSld">
-      <pc:chgData name="Jan K" userId="d066db4a5de46abf" providerId="LiveId" clId="{E06D0A26-AC22-4BF5-A863-C0599575D8F1}" dt="2024-03-21T17:37:22.900" v="6" actId="207"/>
+    <pc:docChg chg="custSel addSld modSld">
+      <pc:chgData name="Jan K" userId="d066db4a5de46abf" providerId="LiveId" clId="{E06D0A26-AC22-4BF5-A863-C0599575D8F1}" dt="2024-03-21T17:53:53.643" v="11" actId="1076"/>
       <pc:docMkLst>
         <pc:docMk/>
       </pc:docMkLst>
@@ -522,6 +523,37 @@
             <ac:cxnSpMk id="21" creationId="{F94390CD-3919-C79D-10EF-F714AF704BE9}"/>
           </ac:cxnSpMkLst>
         </pc:cxnChg>
+      </pc:sldChg>
+      <pc:sldChg chg="addSp delSp modSp new mod">
+        <pc:chgData name="Jan K" userId="d066db4a5de46abf" providerId="LiveId" clId="{E06D0A26-AC22-4BF5-A863-C0599575D8F1}" dt="2024-03-21T17:53:53.643" v="11" actId="1076"/>
+        <pc:sldMkLst>
+          <pc:docMk/>
+          <pc:sldMk cId="3624701327" sldId="258"/>
+        </pc:sldMkLst>
+        <pc:spChg chg="del">
+          <ac:chgData name="Jan K" userId="d066db4a5de46abf" providerId="LiveId" clId="{E06D0A26-AC22-4BF5-A863-C0599575D8F1}" dt="2024-03-21T17:53:30.229" v="8" actId="478"/>
+          <ac:spMkLst>
+            <pc:docMk/>
+            <pc:sldMk cId="3624701327" sldId="258"/>
+            <ac:spMk id="2" creationId="{D14BAB80-B740-0023-A2ED-006C851C562E}"/>
+          </ac:spMkLst>
+        </pc:spChg>
+        <pc:spChg chg="del">
+          <ac:chgData name="Jan K" userId="d066db4a5de46abf" providerId="LiveId" clId="{E06D0A26-AC22-4BF5-A863-C0599575D8F1}" dt="2024-03-21T17:53:30.229" v="8" actId="478"/>
+          <ac:spMkLst>
+            <pc:docMk/>
+            <pc:sldMk cId="3624701327" sldId="258"/>
+            <ac:spMk id="3" creationId="{6860CBCE-687A-B3D5-D6C6-8A90C3660A25}"/>
+          </ac:spMkLst>
+        </pc:spChg>
+        <pc:picChg chg="add mod">
+          <ac:chgData name="Jan K" userId="d066db4a5de46abf" providerId="LiveId" clId="{E06D0A26-AC22-4BF5-A863-C0599575D8F1}" dt="2024-03-21T17:53:53.643" v="11" actId="1076"/>
+          <ac:picMkLst>
+            <pc:docMk/>
+            <pc:sldMk cId="3624701327" sldId="258"/>
+            <ac:picMk id="5" creationId="{A8B8ECC3-BC61-EDC8-07F2-FBAECE781C93}"/>
+          </ac:picMkLst>
+        </pc:picChg>
       </pc:sldChg>
     </pc:docChg>
   </pc:docChgLst>
@@ -5151,6 +5183,75 @@
 </p:sld>
 </file>
 
+<file path=ppt/slides/slide3.xml><?xml version="1.0" encoding="utf-8"?>
+<p:sld xmlns:a="http://schemas.openxmlformats.org/drawingml/2006/main" xmlns:r="http://schemas.openxmlformats.org/officeDocument/2006/relationships" xmlns:p="http://schemas.openxmlformats.org/presentationml/2006/main">
+  <p:cSld>
+    <p:spTree>
+      <p:nvGrpSpPr>
+        <p:cNvPr id="1" name=""/>
+        <p:cNvGrpSpPr/>
+        <p:nvPr/>
+      </p:nvGrpSpPr>
+      <p:grpSpPr>
+        <a:xfrm>
+          <a:off x="0" y="0"/>
+          <a:ext cx="0" cy="0"/>
+          <a:chOff x="0" y="0"/>
+          <a:chExt cx="0" cy="0"/>
+        </a:xfrm>
+      </p:grpSpPr>
+      <p:pic>
+        <p:nvPicPr>
+          <p:cNvPr id="5" name="Grafik 4" descr="Markierung mit einfarbiger Füllung">
+            <a:extLst>
+              <a:ext uri="{FF2B5EF4-FFF2-40B4-BE49-F238E27FC236}">
+                <a16:creationId xmlns:a16="http://schemas.microsoft.com/office/drawing/2014/main" id="{A8B8ECC3-BC61-EDC8-07F2-FBAECE781C93}"/>
+              </a:ext>
+            </a:extLst>
+          </p:cNvPr>
+          <p:cNvPicPr>
+            <a:picLocks noChangeAspect="1"/>
+          </p:cNvPicPr>
+          <p:nvPr/>
+        </p:nvPicPr>
+        <p:blipFill>
+          <a:blip r:embed="rId2">
+            <a:extLst>
+              <a:ext uri="{28A0092B-C50C-407E-A947-70E740481C1C}">
+                <a14:useLocalDpi xmlns:a14="http://schemas.microsoft.com/office/drawing/2010/main" val="0"/>
+              </a:ext>
+              <a:ext uri="{96DAC541-7B7A-43D3-8B79-37D633B846F1}">
+                <asvg:svgBlip xmlns:asvg="http://schemas.microsoft.com/office/drawing/2016/SVG/main" r:embed="rId3"/>
+              </a:ext>
+            </a:extLst>
+          </a:blip>
+          <a:stretch>
+            <a:fillRect/>
+          </a:stretch>
+        </p:blipFill>
+        <p:spPr>
+          <a:xfrm>
+            <a:off x="1987757" y="6455983"/>
+            <a:ext cx="914400" cy="914400"/>
+          </a:xfrm>
+          <a:prstGeom prst="rect">
+            <a:avLst/>
+          </a:prstGeom>
+        </p:spPr>
+      </p:pic>
+    </p:spTree>
+    <p:extLst>
+      <p:ext uri="{BB962C8B-B14F-4D97-AF65-F5344CB8AC3E}">
+        <p14:creationId xmlns:p14="http://schemas.microsoft.com/office/powerpoint/2010/main" val="3624701327"/>
+      </p:ext>
+    </p:extLst>
+  </p:cSld>
+  <p:clrMapOvr>
+    <a:masterClrMapping/>
+  </p:clrMapOvr>
+</p:sld>
+</file>
+
 <file path=ppt/theme/theme1.xml><?xml version="1.0" encoding="utf-8"?>
 <a:theme xmlns:a="http://schemas.openxmlformats.org/drawingml/2006/main" name="Office">
   <a:themeElements>

</xml_diff>